<commit_message>
adding the 2 modules example
</commit_message>
<xml_diff>
--- a/Terraform.pptx
+++ b/Terraform.pptx
@@ -124,7 +124,7 @@
   </p:defaultTextStyle>
   <p:extLst>
     <p:ext uri="{EFAFB233-063F-42B5-8137-9DF3F51BA10A}">
-      <p15:sldGuideLst xmlns:p15="http://schemas.microsoft.com/office/powerpoint/2012/main" xmlns=""/>
+      <p15:sldGuideLst xmlns="" xmlns:p15="http://schemas.microsoft.com/office/powerpoint/2012/main"/>
     </p:ext>
   </p:extLst>
 </p:presentation>
@@ -152,7 +152,7 @@
           <p:cNvPr id="2" name="Título 1">
             <a:extLst>
               <a:ext uri="{FF2B5EF4-FFF2-40B4-BE49-F238E27FC236}">
-                <a16:creationId xmlns:a16="http://schemas.microsoft.com/office/drawing/2014/main" xmlns="" id="{C1614C11-B21C-4242-9A2A-736D421E21AC}"/>
+                <a16:creationId xmlns="" xmlns:a16="http://schemas.microsoft.com/office/drawing/2014/main" id="{C1614C11-B21C-4242-9A2A-736D421E21AC}"/>
               </a:ext>
             </a:extLst>
           </p:cNvPr>
@@ -189,7 +189,7 @@
           <p:cNvPr id="3" name="Subtítulo 2">
             <a:extLst>
               <a:ext uri="{FF2B5EF4-FFF2-40B4-BE49-F238E27FC236}">
-                <a16:creationId xmlns:a16="http://schemas.microsoft.com/office/drawing/2014/main" xmlns="" id="{FBC636CA-74DC-4166-ACE2-75C5B39A7481}"/>
+                <a16:creationId xmlns="" xmlns:a16="http://schemas.microsoft.com/office/drawing/2014/main" id="{FBC636CA-74DC-4166-ACE2-75C5B39A7481}"/>
               </a:ext>
             </a:extLst>
           </p:cNvPr>
@@ -259,7 +259,7 @@
           <p:cNvPr id="4" name="Marcador de fecha 3">
             <a:extLst>
               <a:ext uri="{FF2B5EF4-FFF2-40B4-BE49-F238E27FC236}">
-                <a16:creationId xmlns:a16="http://schemas.microsoft.com/office/drawing/2014/main" xmlns="" id="{AA61E2B2-DDC9-4C07-AF80-BF391F573091}"/>
+                <a16:creationId xmlns="" xmlns:a16="http://schemas.microsoft.com/office/drawing/2014/main" id="{AA61E2B2-DDC9-4C07-AF80-BF391F573091}"/>
               </a:ext>
             </a:extLst>
           </p:cNvPr>
@@ -277,7 +277,7 @@
           <a:p>
             <a:fld id="{CF65B41C-DF71-4E4D-8C49-7775C482FF76}" type="datetimeFigureOut">
               <a:rPr lang="es-ES" smtClean="0"/>
-              <a:t>1/19/18</a:t>
+              <a:t>1/22/18</a:t>
             </a:fld>
             <a:endParaRPr lang="es-ES"/>
           </a:p>
@@ -288,7 +288,7 @@
           <p:cNvPr id="5" name="Marcador de pie de página 4">
             <a:extLst>
               <a:ext uri="{FF2B5EF4-FFF2-40B4-BE49-F238E27FC236}">
-                <a16:creationId xmlns:a16="http://schemas.microsoft.com/office/drawing/2014/main" xmlns="" id="{A045E5F6-FF81-44A4-AD8F-908A35085525}"/>
+                <a16:creationId xmlns="" xmlns:a16="http://schemas.microsoft.com/office/drawing/2014/main" id="{A045E5F6-FF81-44A4-AD8F-908A35085525}"/>
               </a:ext>
             </a:extLst>
           </p:cNvPr>
@@ -313,7 +313,7 @@
           <p:cNvPr id="6" name="Marcador de número de diapositiva 5">
             <a:extLst>
               <a:ext uri="{FF2B5EF4-FFF2-40B4-BE49-F238E27FC236}">
-                <a16:creationId xmlns:a16="http://schemas.microsoft.com/office/drawing/2014/main" xmlns="" id="{7443EBBB-06F3-4B82-81F9-E21E312422D4}"/>
+                <a16:creationId xmlns="" xmlns:a16="http://schemas.microsoft.com/office/drawing/2014/main" id="{7443EBBB-06F3-4B82-81F9-E21E312422D4}"/>
               </a:ext>
             </a:extLst>
           </p:cNvPr>
@@ -372,7 +372,7 @@
           <p:cNvPr id="2" name="Título 1">
             <a:extLst>
               <a:ext uri="{FF2B5EF4-FFF2-40B4-BE49-F238E27FC236}">
-                <a16:creationId xmlns:a16="http://schemas.microsoft.com/office/drawing/2014/main" xmlns="" id="{486B698E-6F3F-4444-BB45-7DF400879DB5}"/>
+                <a16:creationId xmlns="" xmlns:a16="http://schemas.microsoft.com/office/drawing/2014/main" id="{486B698E-6F3F-4444-BB45-7DF400879DB5}"/>
               </a:ext>
             </a:extLst>
           </p:cNvPr>
@@ -400,7 +400,7 @@
           <p:cNvPr id="3" name="Marcador de texto vertical 2">
             <a:extLst>
               <a:ext uri="{FF2B5EF4-FFF2-40B4-BE49-F238E27FC236}">
-                <a16:creationId xmlns:a16="http://schemas.microsoft.com/office/drawing/2014/main" xmlns="" id="{76DC30AA-0CDA-4FBB-9DF8-445D5030FA5D}"/>
+                <a16:creationId xmlns="" xmlns:a16="http://schemas.microsoft.com/office/drawing/2014/main" id="{76DC30AA-0CDA-4FBB-9DF8-445D5030FA5D}"/>
               </a:ext>
             </a:extLst>
           </p:cNvPr>
@@ -457,7 +457,7 @@
           <p:cNvPr id="4" name="Marcador de fecha 3">
             <a:extLst>
               <a:ext uri="{FF2B5EF4-FFF2-40B4-BE49-F238E27FC236}">
-                <a16:creationId xmlns:a16="http://schemas.microsoft.com/office/drawing/2014/main" xmlns="" id="{04AD754D-6592-49B3-80B4-063584C012E6}"/>
+                <a16:creationId xmlns="" xmlns:a16="http://schemas.microsoft.com/office/drawing/2014/main" id="{04AD754D-6592-49B3-80B4-063584C012E6}"/>
               </a:ext>
             </a:extLst>
           </p:cNvPr>
@@ -475,7 +475,7 @@
           <a:p>
             <a:fld id="{CF65B41C-DF71-4E4D-8C49-7775C482FF76}" type="datetimeFigureOut">
               <a:rPr lang="es-ES" smtClean="0"/>
-              <a:t>1/19/18</a:t>
+              <a:t>1/22/18</a:t>
             </a:fld>
             <a:endParaRPr lang="es-ES"/>
           </a:p>
@@ -486,7 +486,7 @@
           <p:cNvPr id="5" name="Marcador de pie de página 4">
             <a:extLst>
               <a:ext uri="{FF2B5EF4-FFF2-40B4-BE49-F238E27FC236}">
-                <a16:creationId xmlns:a16="http://schemas.microsoft.com/office/drawing/2014/main" xmlns="" id="{BF4E7D1E-FB0B-44D7-9B06-469AD12047D7}"/>
+                <a16:creationId xmlns="" xmlns:a16="http://schemas.microsoft.com/office/drawing/2014/main" id="{BF4E7D1E-FB0B-44D7-9B06-469AD12047D7}"/>
               </a:ext>
             </a:extLst>
           </p:cNvPr>
@@ -511,7 +511,7 @@
           <p:cNvPr id="6" name="Marcador de número de diapositiva 5">
             <a:extLst>
               <a:ext uri="{FF2B5EF4-FFF2-40B4-BE49-F238E27FC236}">
-                <a16:creationId xmlns:a16="http://schemas.microsoft.com/office/drawing/2014/main" xmlns="" id="{9EE83D72-F3A0-4E53-863F-04024F5B6DE2}"/>
+                <a16:creationId xmlns="" xmlns:a16="http://schemas.microsoft.com/office/drawing/2014/main" id="{9EE83D72-F3A0-4E53-863F-04024F5B6DE2}"/>
               </a:ext>
             </a:extLst>
           </p:cNvPr>
@@ -570,7 +570,7 @@
           <p:cNvPr id="2" name="Título vertical 1">
             <a:extLst>
               <a:ext uri="{FF2B5EF4-FFF2-40B4-BE49-F238E27FC236}">
-                <a16:creationId xmlns:a16="http://schemas.microsoft.com/office/drawing/2014/main" xmlns="" id="{EA3AADA7-C9EF-4973-A157-3B5996EFA191}"/>
+                <a16:creationId xmlns="" xmlns:a16="http://schemas.microsoft.com/office/drawing/2014/main" id="{EA3AADA7-C9EF-4973-A157-3B5996EFA191}"/>
               </a:ext>
             </a:extLst>
           </p:cNvPr>
@@ -603,7 +603,7 @@
           <p:cNvPr id="3" name="Marcador de texto vertical 2">
             <a:extLst>
               <a:ext uri="{FF2B5EF4-FFF2-40B4-BE49-F238E27FC236}">
-                <a16:creationId xmlns:a16="http://schemas.microsoft.com/office/drawing/2014/main" xmlns="" id="{031B6683-BB1C-4819-AB56-A85A9E692336}"/>
+                <a16:creationId xmlns="" xmlns:a16="http://schemas.microsoft.com/office/drawing/2014/main" id="{031B6683-BB1C-4819-AB56-A85A9E692336}"/>
               </a:ext>
             </a:extLst>
           </p:cNvPr>
@@ -665,7 +665,7 @@
           <p:cNvPr id="4" name="Marcador de fecha 3">
             <a:extLst>
               <a:ext uri="{FF2B5EF4-FFF2-40B4-BE49-F238E27FC236}">
-                <a16:creationId xmlns:a16="http://schemas.microsoft.com/office/drawing/2014/main" xmlns="" id="{D06F50B8-6495-404B-A845-0486C5A13D77}"/>
+                <a16:creationId xmlns="" xmlns:a16="http://schemas.microsoft.com/office/drawing/2014/main" id="{D06F50B8-6495-404B-A845-0486C5A13D77}"/>
               </a:ext>
             </a:extLst>
           </p:cNvPr>
@@ -683,7 +683,7 @@
           <a:p>
             <a:fld id="{CF65B41C-DF71-4E4D-8C49-7775C482FF76}" type="datetimeFigureOut">
               <a:rPr lang="es-ES" smtClean="0"/>
-              <a:t>1/19/18</a:t>
+              <a:t>1/22/18</a:t>
             </a:fld>
             <a:endParaRPr lang="es-ES"/>
           </a:p>
@@ -694,7 +694,7 @@
           <p:cNvPr id="5" name="Marcador de pie de página 4">
             <a:extLst>
               <a:ext uri="{FF2B5EF4-FFF2-40B4-BE49-F238E27FC236}">
-                <a16:creationId xmlns:a16="http://schemas.microsoft.com/office/drawing/2014/main" xmlns="" id="{8900064A-5F93-4A38-8F77-47F5B559FDAF}"/>
+                <a16:creationId xmlns="" xmlns:a16="http://schemas.microsoft.com/office/drawing/2014/main" id="{8900064A-5F93-4A38-8F77-47F5B559FDAF}"/>
               </a:ext>
             </a:extLst>
           </p:cNvPr>
@@ -719,7 +719,7 @@
           <p:cNvPr id="6" name="Marcador de número de diapositiva 5">
             <a:extLst>
               <a:ext uri="{FF2B5EF4-FFF2-40B4-BE49-F238E27FC236}">
-                <a16:creationId xmlns:a16="http://schemas.microsoft.com/office/drawing/2014/main" xmlns="" id="{8B0E6A39-4F6E-49F9-B134-50F175F7C679}"/>
+                <a16:creationId xmlns="" xmlns:a16="http://schemas.microsoft.com/office/drawing/2014/main" id="{8B0E6A39-4F6E-49F9-B134-50F175F7C679}"/>
               </a:ext>
             </a:extLst>
           </p:cNvPr>
@@ -778,7 +778,7 @@
           <p:cNvPr id="2" name="Título 1">
             <a:extLst>
               <a:ext uri="{FF2B5EF4-FFF2-40B4-BE49-F238E27FC236}">
-                <a16:creationId xmlns:a16="http://schemas.microsoft.com/office/drawing/2014/main" xmlns="" id="{A5CFBD32-98B1-46F7-9758-E4E3DC695053}"/>
+                <a16:creationId xmlns="" xmlns:a16="http://schemas.microsoft.com/office/drawing/2014/main" id="{A5CFBD32-98B1-46F7-9758-E4E3DC695053}"/>
               </a:ext>
             </a:extLst>
           </p:cNvPr>
@@ -806,7 +806,7 @@
           <p:cNvPr id="3" name="Marcador de contenido 2">
             <a:extLst>
               <a:ext uri="{FF2B5EF4-FFF2-40B4-BE49-F238E27FC236}">
-                <a16:creationId xmlns:a16="http://schemas.microsoft.com/office/drawing/2014/main" xmlns="" id="{DDA7963B-E195-4A40-B6BD-2C96159BBAC3}"/>
+                <a16:creationId xmlns="" xmlns:a16="http://schemas.microsoft.com/office/drawing/2014/main" id="{DDA7963B-E195-4A40-B6BD-2C96159BBAC3}"/>
               </a:ext>
             </a:extLst>
           </p:cNvPr>
@@ -863,7 +863,7 @@
           <p:cNvPr id="4" name="Marcador de fecha 3">
             <a:extLst>
               <a:ext uri="{FF2B5EF4-FFF2-40B4-BE49-F238E27FC236}">
-                <a16:creationId xmlns:a16="http://schemas.microsoft.com/office/drawing/2014/main" xmlns="" id="{CF8B8542-9ECE-4F3B-AA4A-A292820D542C}"/>
+                <a16:creationId xmlns="" xmlns:a16="http://schemas.microsoft.com/office/drawing/2014/main" id="{CF8B8542-9ECE-4F3B-AA4A-A292820D542C}"/>
               </a:ext>
             </a:extLst>
           </p:cNvPr>
@@ -881,7 +881,7 @@
           <a:p>
             <a:fld id="{CF65B41C-DF71-4E4D-8C49-7775C482FF76}" type="datetimeFigureOut">
               <a:rPr lang="es-ES" smtClean="0"/>
-              <a:t>1/19/18</a:t>
+              <a:t>1/22/18</a:t>
             </a:fld>
             <a:endParaRPr lang="es-ES"/>
           </a:p>
@@ -892,7 +892,7 @@
           <p:cNvPr id="5" name="Marcador de pie de página 4">
             <a:extLst>
               <a:ext uri="{FF2B5EF4-FFF2-40B4-BE49-F238E27FC236}">
-                <a16:creationId xmlns:a16="http://schemas.microsoft.com/office/drawing/2014/main" xmlns="" id="{E62EF718-5A57-4B1B-8BD6-8AA10EFD2428}"/>
+                <a16:creationId xmlns="" xmlns:a16="http://schemas.microsoft.com/office/drawing/2014/main" id="{E62EF718-5A57-4B1B-8BD6-8AA10EFD2428}"/>
               </a:ext>
             </a:extLst>
           </p:cNvPr>
@@ -917,7 +917,7 @@
           <p:cNvPr id="6" name="Marcador de número de diapositiva 5">
             <a:extLst>
               <a:ext uri="{FF2B5EF4-FFF2-40B4-BE49-F238E27FC236}">
-                <a16:creationId xmlns:a16="http://schemas.microsoft.com/office/drawing/2014/main" xmlns="" id="{CA7BE855-F24F-4454-B43A-29E14484B035}"/>
+                <a16:creationId xmlns="" xmlns:a16="http://schemas.microsoft.com/office/drawing/2014/main" id="{CA7BE855-F24F-4454-B43A-29E14484B035}"/>
               </a:ext>
             </a:extLst>
           </p:cNvPr>
@@ -976,7 +976,7 @@
           <p:cNvPr id="2" name="Título 1">
             <a:extLst>
               <a:ext uri="{FF2B5EF4-FFF2-40B4-BE49-F238E27FC236}">
-                <a16:creationId xmlns:a16="http://schemas.microsoft.com/office/drawing/2014/main" xmlns="" id="{943459BB-EA96-4B55-9E4A-54F7554CA59A}"/>
+                <a16:creationId xmlns="" xmlns:a16="http://schemas.microsoft.com/office/drawing/2014/main" id="{943459BB-EA96-4B55-9E4A-54F7554CA59A}"/>
               </a:ext>
             </a:extLst>
           </p:cNvPr>
@@ -1013,7 +1013,7 @@
           <p:cNvPr id="3" name="Marcador de texto 2">
             <a:extLst>
               <a:ext uri="{FF2B5EF4-FFF2-40B4-BE49-F238E27FC236}">
-                <a16:creationId xmlns:a16="http://schemas.microsoft.com/office/drawing/2014/main" xmlns="" id="{DD5C568B-7D82-49A2-878E-5160AA963AC2}"/>
+                <a16:creationId xmlns="" xmlns:a16="http://schemas.microsoft.com/office/drawing/2014/main" id="{DD5C568B-7D82-49A2-878E-5160AA963AC2}"/>
               </a:ext>
             </a:extLst>
           </p:cNvPr>
@@ -1138,7 +1138,7 @@
           <p:cNvPr id="4" name="Marcador de fecha 3">
             <a:extLst>
               <a:ext uri="{FF2B5EF4-FFF2-40B4-BE49-F238E27FC236}">
-                <a16:creationId xmlns:a16="http://schemas.microsoft.com/office/drawing/2014/main" xmlns="" id="{25B489A0-2C10-4CEC-892D-DF2BA362E630}"/>
+                <a16:creationId xmlns="" xmlns:a16="http://schemas.microsoft.com/office/drawing/2014/main" id="{25B489A0-2C10-4CEC-892D-DF2BA362E630}"/>
               </a:ext>
             </a:extLst>
           </p:cNvPr>
@@ -1156,7 +1156,7 @@
           <a:p>
             <a:fld id="{CF65B41C-DF71-4E4D-8C49-7775C482FF76}" type="datetimeFigureOut">
               <a:rPr lang="es-ES" smtClean="0"/>
-              <a:t>1/19/18</a:t>
+              <a:t>1/22/18</a:t>
             </a:fld>
             <a:endParaRPr lang="es-ES"/>
           </a:p>
@@ -1167,7 +1167,7 @@
           <p:cNvPr id="5" name="Marcador de pie de página 4">
             <a:extLst>
               <a:ext uri="{FF2B5EF4-FFF2-40B4-BE49-F238E27FC236}">
-                <a16:creationId xmlns:a16="http://schemas.microsoft.com/office/drawing/2014/main" xmlns="" id="{3252383E-332E-45C5-80C6-7BC5711BC904}"/>
+                <a16:creationId xmlns="" xmlns:a16="http://schemas.microsoft.com/office/drawing/2014/main" id="{3252383E-332E-45C5-80C6-7BC5711BC904}"/>
               </a:ext>
             </a:extLst>
           </p:cNvPr>
@@ -1192,7 +1192,7 @@
           <p:cNvPr id="6" name="Marcador de número de diapositiva 5">
             <a:extLst>
               <a:ext uri="{FF2B5EF4-FFF2-40B4-BE49-F238E27FC236}">
-                <a16:creationId xmlns:a16="http://schemas.microsoft.com/office/drawing/2014/main" xmlns="" id="{98031B06-55AA-4E35-AF9B-3BF385566B21}"/>
+                <a16:creationId xmlns="" xmlns:a16="http://schemas.microsoft.com/office/drawing/2014/main" id="{98031B06-55AA-4E35-AF9B-3BF385566B21}"/>
               </a:ext>
             </a:extLst>
           </p:cNvPr>
@@ -1251,7 +1251,7 @@
           <p:cNvPr id="2" name="Título 1">
             <a:extLst>
               <a:ext uri="{FF2B5EF4-FFF2-40B4-BE49-F238E27FC236}">
-                <a16:creationId xmlns:a16="http://schemas.microsoft.com/office/drawing/2014/main" xmlns="" id="{AECE8B3C-2A8A-4C8C-A59D-A7D357D67BB6}"/>
+                <a16:creationId xmlns="" xmlns:a16="http://schemas.microsoft.com/office/drawing/2014/main" id="{AECE8B3C-2A8A-4C8C-A59D-A7D357D67BB6}"/>
               </a:ext>
             </a:extLst>
           </p:cNvPr>
@@ -1279,7 +1279,7 @@
           <p:cNvPr id="3" name="Marcador de contenido 2">
             <a:extLst>
               <a:ext uri="{FF2B5EF4-FFF2-40B4-BE49-F238E27FC236}">
-                <a16:creationId xmlns:a16="http://schemas.microsoft.com/office/drawing/2014/main" xmlns="" id="{5968344D-2345-453A-B148-AC76ED0FB803}"/>
+                <a16:creationId xmlns="" xmlns:a16="http://schemas.microsoft.com/office/drawing/2014/main" id="{5968344D-2345-453A-B148-AC76ED0FB803}"/>
               </a:ext>
             </a:extLst>
           </p:cNvPr>
@@ -1341,7 +1341,7 @@
           <p:cNvPr id="4" name="Marcador de contenido 3">
             <a:extLst>
               <a:ext uri="{FF2B5EF4-FFF2-40B4-BE49-F238E27FC236}">
-                <a16:creationId xmlns:a16="http://schemas.microsoft.com/office/drawing/2014/main" xmlns="" id="{A3D9F04D-66D3-40DC-AE82-0A4DB599495F}"/>
+                <a16:creationId xmlns="" xmlns:a16="http://schemas.microsoft.com/office/drawing/2014/main" id="{A3D9F04D-66D3-40DC-AE82-0A4DB599495F}"/>
               </a:ext>
             </a:extLst>
           </p:cNvPr>
@@ -1403,7 +1403,7 @@
           <p:cNvPr id="5" name="Marcador de fecha 4">
             <a:extLst>
               <a:ext uri="{FF2B5EF4-FFF2-40B4-BE49-F238E27FC236}">
-                <a16:creationId xmlns:a16="http://schemas.microsoft.com/office/drawing/2014/main" xmlns="" id="{D9811964-CC88-45B8-988A-3FE5BC22F408}"/>
+                <a16:creationId xmlns="" xmlns:a16="http://schemas.microsoft.com/office/drawing/2014/main" id="{D9811964-CC88-45B8-988A-3FE5BC22F408}"/>
               </a:ext>
             </a:extLst>
           </p:cNvPr>
@@ -1421,7 +1421,7 @@
           <a:p>
             <a:fld id="{CF65B41C-DF71-4E4D-8C49-7775C482FF76}" type="datetimeFigureOut">
               <a:rPr lang="es-ES" smtClean="0"/>
-              <a:t>1/19/18</a:t>
+              <a:t>1/22/18</a:t>
             </a:fld>
             <a:endParaRPr lang="es-ES"/>
           </a:p>
@@ -1432,7 +1432,7 @@
           <p:cNvPr id="6" name="Marcador de pie de página 5">
             <a:extLst>
               <a:ext uri="{FF2B5EF4-FFF2-40B4-BE49-F238E27FC236}">
-                <a16:creationId xmlns:a16="http://schemas.microsoft.com/office/drawing/2014/main" xmlns="" id="{475A5061-5899-4B49-B479-2D7CBA5408F2}"/>
+                <a16:creationId xmlns="" xmlns:a16="http://schemas.microsoft.com/office/drawing/2014/main" id="{475A5061-5899-4B49-B479-2D7CBA5408F2}"/>
               </a:ext>
             </a:extLst>
           </p:cNvPr>
@@ -1457,7 +1457,7 @@
           <p:cNvPr id="7" name="Marcador de número de diapositiva 6">
             <a:extLst>
               <a:ext uri="{FF2B5EF4-FFF2-40B4-BE49-F238E27FC236}">
-                <a16:creationId xmlns:a16="http://schemas.microsoft.com/office/drawing/2014/main" xmlns="" id="{75966019-26A9-4D16-8CAF-94BEC7D599AE}"/>
+                <a16:creationId xmlns="" xmlns:a16="http://schemas.microsoft.com/office/drawing/2014/main" id="{75966019-26A9-4D16-8CAF-94BEC7D599AE}"/>
               </a:ext>
             </a:extLst>
           </p:cNvPr>
@@ -1516,7 +1516,7 @@
           <p:cNvPr id="2" name="Título 1">
             <a:extLst>
               <a:ext uri="{FF2B5EF4-FFF2-40B4-BE49-F238E27FC236}">
-                <a16:creationId xmlns:a16="http://schemas.microsoft.com/office/drawing/2014/main" xmlns="" id="{7B8F51FA-1423-4674-8022-729F1146058B}"/>
+                <a16:creationId xmlns="" xmlns:a16="http://schemas.microsoft.com/office/drawing/2014/main" id="{7B8F51FA-1423-4674-8022-729F1146058B}"/>
               </a:ext>
             </a:extLst>
           </p:cNvPr>
@@ -1549,7 +1549,7 @@
           <p:cNvPr id="3" name="Marcador de texto 2">
             <a:extLst>
               <a:ext uri="{FF2B5EF4-FFF2-40B4-BE49-F238E27FC236}">
-                <a16:creationId xmlns:a16="http://schemas.microsoft.com/office/drawing/2014/main" xmlns="" id="{0966EF0D-2B5E-493E-B7F2-D2DBD0050089}"/>
+                <a16:creationId xmlns="" xmlns:a16="http://schemas.microsoft.com/office/drawing/2014/main" id="{0966EF0D-2B5E-493E-B7F2-D2DBD0050089}"/>
               </a:ext>
             </a:extLst>
           </p:cNvPr>
@@ -1620,7 +1620,7 @@
           <p:cNvPr id="4" name="Marcador de contenido 3">
             <a:extLst>
               <a:ext uri="{FF2B5EF4-FFF2-40B4-BE49-F238E27FC236}">
-                <a16:creationId xmlns:a16="http://schemas.microsoft.com/office/drawing/2014/main" xmlns="" id="{3A32CA03-1A40-432D-80E5-39CF739DBE80}"/>
+                <a16:creationId xmlns="" xmlns:a16="http://schemas.microsoft.com/office/drawing/2014/main" id="{3A32CA03-1A40-432D-80E5-39CF739DBE80}"/>
               </a:ext>
             </a:extLst>
           </p:cNvPr>
@@ -1682,7 +1682,7 @@
           <p:cNvPr id="5" name="Marcador de texto 4">
             <a:extLst>
               <a:ext uri="{FF2B5EF4-FFF2-40B4-BE49-F238E27FC236}">
-                <a16:creationId xmlns:a16="http://schemas.microsoft.com/office/drawing/2014/main" xmlns="" id="{6F5F7B92-37E8-489E-961F-6E82D6F57EBE}"/>
+                <a16:creationId xmlns="" xmlns:a16="http://schemas.microsoft.com/office/drawing/2014/main" id="{6F5F7B92-37E8-489E-961F-6E82D6F57EBE}"/>
               </a:ext>
             </a:extLst>
           </p:cNvPr>
@@ -1753,7 +1753,7 @@
           <p:cNvPr id="6" name="Marcador de contenido 5">
             <a:extLst>
               <a:ext uri="{FF2B5EF4-FFF2-40B4-BE49-F238E27FC236}">
-                <a16:creationId xmlns:a16="http://schemas.microsoft.com/office/drawing/2014/main" xmlns="" id="{2EA766D3-703F-49D2-A66A-73B5CEB8C455}"/>
+                <a16:creationId xmlns="" xmlns:a16="http://schemas.microsoft.com/office/drawing/2014/main" id="{2EA766D3-703F-49D2-A66A-73B5CEB8C455}"/>
               </a:ext>
             </a:extLst>
           </p:cNvPr>
@@ -1815,7 +1815,7 @@
           <p:cNvPr id="7" name="Marcador de fecha 6">
             <a:extLst>
               <a:ext uri="{FF2B5EF4-FFF2-40B4-BE49-F238E27FC236}">
-                <a16:creationId xmlns:a16="http://schemas.microsoft.com/office/drawing/2014/main" xmlns="" id="{5BC4F416-1B2B-445F-8231-9D3886737076}"/>
+                <a16:creationId xmlns="" xmlns:a16="http://schemas.microsoft.com/office/drawing/2014/main" id="{5BC4F416-1B2B-445F-8231-9D3886737076}"/>
               </a:ext>
             </a:extLst>
           </p:cNvPr>
@@ -1833,7 +1833,7 @@
           <a:p>
             <a:fld id="{CF65B41C-DF71-4E4D-8C49-7775C482FF76}" type="datetimeFigureOut">
               <a:rPr lang="es-ES" smtClean="0"/>
-              <a:t>1/19/18</a:t>
+              <a:t>1/22/18</a:t>
             </a:fld>
             <a:endParaRPr lang="es-ES"/>
           </a:p>
@@ -1844,7 +1844,7 @@
           <p:cNvPr id="8" name="Marcador de pie de página 7">
             <a:extLst>
               <a:ext uri="{FF2B5EF4-FFF2-40B4-BE49-F238E27FC236}">
-                <a16:creationId xmlns:a16="http://schemas.microsoft.com/office/drawing/2014/main" xmlns="" id="{3BC10775-7394-4344-A9D0-A369DC4BC7A2}"/>
+                <a16:creationId xmlns="" xmlns:a16="http://schemas.microsoft.com/office/drawing/2014/main" id="{3BC10775-7394-4344-A9D0-A369DC4BC7A2}"/>
               </a:ext>
             </a:extLst>
           </p:cNvPr>
@@ -1869,7 +1869,7 @@
           <p:cNvPr id="9" name="Marcador de número de diapositiva 8">
             <a:extLst>
               <a:ext uri="{FF2B5EF4-FFF2-40B4-BE49-F238E27FC236}">
-                <a16:creationId xmlns:a16="http://schemas.microsoft.com/office/drawing/2014/main" xmlns="" id="{0BA7FA13-1C23-42CB-8C48-CC7D47DEC6C4}"/>
+                <a16:creationId xmlns="" xmlns:a16="http://schemas.microsoft.com/office/drawing/2014/main" id="{0BA7FA13-1C23-42CB-8C48-CC7D47DEC6C4}"/>
               </a:ext>
             </a:extLst>
           </p:cNvPr>
@@ -1928,7 +1928,7 @@
           <p:cNvPr id="2" name="Título 1">
             <a:extLst>
               <a:ext uri="{FF2B5EF4-FFF2-40B4-BE49-F238E27FC236}">
-                <a16:creationId xmlns:a16="http://schemas.microsoft.com/office/drawing/2014/main" xmlns="" id="{548E41BC-7F65-46C4-B05F-9A64DAE6D29C}"/>
+                <a16:creationId xmlns="" xmlns:a16="http://schemas.microsoft.com/office/drawing/2014/main" id="{548E41BC-7F65-46C4-B05F-9A64DAE6D29C}"/>
               </a:ext>
             </a:extLst>
           </p:cNvPr>
@@ -1956,7 +1956,7 @@
           <p:cNvPr id="3" name="Marcador de fecha 2">
             <a:extLst>
               <a:ext uri="{FF2B5EF4-FFF2-40B4-BE49-F238E27FC236}">
-                <a16:creationId xmlns:a16="http://schemas.microsoft.com/office/drawing/2014/main" xmlns="" id="{778BF6C9-D8C8-4CBC-BE84-2C3EFB5D2DDF}"/>
+                <a16:creationId xmlns="" xmlns:a16="http://schemas.microsoft.com/office/drawing/2014/main" id="{778BF6C9-D8C8-4CBC-BE84-2C3EFB5D2DDF}"/>
               </a:ext>
             </a:extLst>
           </p:cNvPr>
@@ -1974,7 +1974,7 @@
           <a:p>
             <a:fld id="{CF65B41C-DF71-4E4D-8C49-7775C482FF76}" type="datetimeFigureOut">
               <a:rPr lang="es-ES" smtClean="0"/>
-              <a:t>1/19/18</a:t>
+              <a:t>1/22/18</a:t>
             </a:fld>
             <a:endParaRPr lang="es-ES"/>
           </a:p>
@@ -1985,7 +1985,7 @@
           <p:cNvPr id="4" name="Marcador de pie de página 3">
             <a:extLst>
               <a:ext uri="{FF2B5EF4-FFF2-40B4-BE49-F238E27FC236}">
-                <a16:creationId xmlns:a16="http://schemas.microsoft.com/office/drawing/2014/main" xmlns="" id="{99CE0B5C-55A5-489B-968B-46C409A69CC6}"/>
+                <a16:creationId xmlns="" xmlns:a16="http://schemas.microsoft.com/office/drawing/2014/main" id="{99CE0B5C-55A5-489B-968B-46C409A69CC6}"/>
               </a:ext>
             </a:extLst>
           </p:cNvPr>
@@ -2010,7 +2010,7 @@
           <p:cNvPr id="5" name="Marcador de número de diapositiva 4">
             <a:extLst>
               <a:ext uri="{FF2B5EF4-FFF2-40B4-BE49-F238E27FC236}">
-                <a16:creationId xmlns:a16="http://schemas.microsoft.com/office/drawing/2014/main" xmlns="" id="{912443B3-8443-43FC-984E-B120D24E2FFB}"/>
+                <a16:creationId xmlns="" xmlns:a16="http://schemas.microsoft.com/office/drawing/2014/main" id="{912443B3-8443-43FC-984E-B120D24E2FFB}"/>
               </a:ext>
             </a:extLst>
           </p:cNvPr>
@@ -2069,7 +2069,7 @@
           <p:cNvPr id="2" name="Marcador de fecha 1">
             <a:extLst>
               <a:ext uri="{FF2B5EF4-FFF2-40B4-BE49-F238E27FC236}">
-                <a16:creationId xmlns:a16="http://schemas.microsoft.com/office/drawing/2014/main" xmlns="" id="{80B6727C-434C-4C32-9232-727FE1E6ABEA}"/>
+                <a16:creationId xmlns="" xmlns:a16="http://schemas.microsoft.com/office/drawing/2014/main" id="{80B6727C-434C-4C32-9232-727FE1E6ABEA}"/>
               </a:ext>
             </a:extLst>
           </p:cNvPr>
@@ -2087,7 +2087,7 @@
           <a:p>
             <a:fld id="{CF65B41C-DF71-4E4D-8C49-7775C482FF76}" type="datetimeFigureOut">
               <a:rPr lang="es-ES" smtClean="0"/>
-              <a:t>1/19/18</a:t>
+              <a:t>1/22/18</a:t>
             </a:fld>
             <a:endParaRPr lang="es-ES"/>
           </a:p>
@@ -2098,7 +2098,7 @@
           <p:cNvPr id="3" name="Marcador de pie de página 2">
             <a:extLst>
               <a:ext uri="{FF2B5EF4-FFF2-40B4-BE49-F238E27FC236}">
-                <a16:creationId xmlns:a16="http://schemas.microsoft.com/office/drawing/2014/main" xmlns="" id="{F94F84E5-2491-48FB-AF22-DAF78A9A9A2F}"/>
+                <a16:creationId xmlns="" xmlns:a16="http://schemas.microsoft.com/office/drawing/2014/main" id="{F94F84E5-2491-48FB-AF22-DAF78A9A9A2F}"/>
               </a:ext>
             </a:extLst>
           </p:cNvPr>
@@ -2123,7 +2123,7 @@
           <p:cNvPr id="4" name="Marcador de número de diapositiva 3">
             <a:extLst>
               <a:ext uri="{FF2B5EF4-FFF2-40B4-BE49-F238E27FC236}">
-                <a16:creationId xmlns:a16="http://schemas.microsoft.com/office/drawing/2014/main" xmlns="" id="{2892D9D9-7941-4463-AE40-54817BA41975}"/>
+                <a16:creationId xmlns="" xmlns:a16="http://schemas.microsoft.com/office/drawing/2014/main" id="{2892D9D9-7941-4463-AE40-54817BA41975}"/>
               </a:ext>
             </a:extLst>
           </p:cNvPr>
@@ -2182,7 +2182,7 @@
           <p:cNvPr id="2" name="Título 1">
             <a:extLst>
               <a:ext uri="{FF2B5EF4-FFF2-40B4-BE49-F238E27FC236}">
-                <a16:creationId xmlns:a16="http://schemas.microsoft.com/office/drawing/2014/main" xmlns="" id="{038BF994-23FF-40EF-BA0F-871CA3C2C061}"/>
+                <a16:creationId xmlns="" xmlns:a16="http://schemas.microsoft.com/office/drawing/2014/main" id="{038BF994-23FF-40EF-BA0F-871CA3C2C061}"/>
               </a:ext>
             </a:extLst>
           </p:cNvPr>
@@ -2219,7 +2219,7 @@
           <p:cNvPr id="3" name="Marcador de contenido 2">
             <a:extLst>
               <a:ext uri="{FF2B5EF4-FFF2-40B4-BE49-F238E27FC236}">
-                <a16:creationId xmlns:a16="http://schemas.microsoft.com/office/drawing/2014/main" xmlns="" id="{4DE4FDF8-3F42-43B0-9ED3-EB004EAD4ECA}"/>
+                <a16:creationId xmlns="" xmlns:a16="http://schemas.microsoft.com/office/drawing/2014/main" id="{4DE4FDF8-3F42-43B0-9ED3-EB004EAD4ECA}"/>
               </a:ext>
             </a:extLst>
           </p:cNvPr>
@@ -2309,7 +2309,7 @@
           <p:cNvPr id="4" name="Marcador de texto 3">
             <a:extLst>
               <a:ext uri="{FF2B5EF4-FFF2-40B4-BE49-F238E27FC236}">
-                <a16:creationId xmlns:a16="http://schemas.microsoft.com/office/drawing/2014/main" xmlns="" id="{759378A2-5380-40BF-903B-3980539D9321}"/>
+                <a16:creationId xmlns="" xmlns:a16="http://schemas.microsoft.com/office/drawing/2014/main" id="{759378A2-5380-40BF-903B-3980539D9321}"/>
               </a:ext>
             </a:extLst>
           </p:cNvPr>
@@ -2380,7 +2380,7 @@
           <p:cNvPr id="5" name="Marcador de fecha 4">
             <a:extLst>
               <a:ext uri="{FF2B5EF4-FFF2-40B4-BE49-F238E27FC236}">
-                <a16:creationId xmlns:a16="http://schemas.microsoft.com/office/drawing/2014/main" xmlns="" id="{1A361570-B4BD-4002-842E-2CE1EAE0574F}"/>
+                <a16:creationId xmlns="" xmlns:a16="http://schemas.microsoft.com/office/drawing/2014/main" id="{1A361570-B4BD-4002-842E-2CE1EAE0574F}"/>
               </a:ext>
             </a:extLst>
           </p:cNvPr>
@@ -2398,7 +2398,7 @@
           <a:p>
             <a:fld id="{CF65B41C-DF71-4E4D-8C49-7775C482FF76}" type="datetimeFigureOut">
               <a:rPr lang="es-ES" smtClean="0"/>
-              <a:t>1/19/18</a:t>
+              <a:t>1/22/18</a:t>
             </a:fld>
             <a:endParaRPr lang="es-ES"/>
           </a:p>
@@ -2409,7 +2409,7 @@
           <p:cNvPr id="6" name="Marcador de pie de página 5">
             <a:extLst>
               <a:ext uri="{FF2B5EF4-FFF2-40B4-BE49-F238E27FC236}">
-                <a16:creationId xmlns:a16="http://schemas.microsoft.com/office/drawing/2014/main" xmlns="" id="{BA36F2F5-2F36-43A7-9315-E3B54DC0AD71}"/>
+                <a16:creationId xmlns="" xmlns:a16="http://schemas.microsoft.com/office/drawing/2014/main" id="{BA36F2F5-2F36-43A7-9315-E3B54DC0AD71}"/>
               </a:ext>
             </a:extLst>
           </p:cNvPr>
@@ -2434,7 +2434,7 @@
           <p:cNvPr id="7" name="Marcador de número de diapositiva 6">
             <a:extLst>
               <a:ext uri="{FF2B5EF4-FFF2-40B4-BE49-F238E27FC236}">
-                <a16:creationId xmlns:a16="http://schemas.microsoft.com/office/drawing/2014/main" xmlns="" id="{2937E811-3782-432C-90CB-7925A787CC16}"/>
+                <a16:creationId xmlns="" xmlns:a16="http://schemas.microsoft.com/office/drawing/2014/main" id="{2937E811-3782-432C-90CB-7925A787CC16}"/>
               </a:ext>
             </a:extLst>
           </p:cNvPr>
@@ -2493,7 +2493,7 @@
           <p:cNvPr id="2" name="Título 1">
             <a:extLst>
               <a:ext uri="{FF2B5EF4-FFF2-40B4-BE49-F238E27FC236}">
-                <a16:creationId xmlns:a16="http://schemas.microsoft.com/office/drawing/2014/main" xmlns="" id="{C67C258C-FA65-47CF-870B-3EF388DBE507}"/>
+                <a16:creationId xmlns="" xmlns:a16="http://schemas.microsoft.com/office/drawing/2014/main" id="{C67C258C-FA65-47CF-870B-3EF388DBE507}"/>
               </a:ext>
             </a:extLst>
           </p:cNvPr>
@@ -2530,7 +2530,7 @@
           <p:cNvPr id="3" name="Marcador de posición de imagen 2">
             <a:extLst>
               <a:ext uri="{FF2B5EF4-FFF2-40B4-BE49-F238E27FC236}">
-                <a16:creationId xmlns:a16="http://schemas.microsoft.com/office/drawing/2014/main" xmlns="" id="{E03D06E4-09CD-49F4-8F88-EEE807D8EF1F}"/>
+                <a16:creationId xmlns="" xmlns:a16="http://schemas.microsoft.com/office/drawing/2014/main" id="{E03D06E4-09CD-49F4-8F88-EEE807D8EF1F}"/>
               </a:ext>
             </a:extLst>
           </p:cNvPr>
@@ -2597,7 +2597,7 @@
           <p:cNvPr id="4" name="Marcador de texto 3">
             <a:extLst>
               <a:ext uri="{FF2B5EF4-FFF2-40B4-BE49-F238E27FC236}">
-                <a16:creationId xmlns:a16="http://schemas.microsoft.com/office/drawing/2014/main" xmlns="" id="{C5279812-4AD8-40D1-BA02-075ED5C2A523}"/>
+                <a16:creationId xmlns="" xmlns:a16="http://schemas.microsoft.com/office/drawing/2014/main" id="{C5279812-4AD8-40D1-BA02-075ED5C2A523}"/>
               </a:ext>
             </a:extLst>
           </p:cNvPr>
@@ -2668,7 +2668,7 @@
           <p:cNvPr id="5" name="Marcador de fecha 4">
             <a:extLst>
               <a:ext uri="{FF2B5EF4-FFF2-40B4-BE49-F238E27FC236}">
-                <a16:creationId xmlns:a16="http://schemas.microsoft.com/office/drawing/2014/main" xmlns="" id="{7AAC640E-77D2-4CCE-992A-0A273DB2C596}"/>
+                <a16:creationId xmlns="" xmlns:a16="http://schemas.microsoft.com/office/drawing/2014/main" id="{7AAC640E-77D2-4CCE-992A-0A273DB2C596}"/>
               </a:ext>
             </a:extLst>
           </p:cNvPr>
@@ -2686,7 +2686,7 @@
           <a:p>
             <a:fld id="{CF65B41C-DF71-4E4D-8C49-7775C482FF76}" type="datetimeFigureOut">
               <a:rPr lang="es-ES" smtClean="0"/>
-              <a:t>1/19/18</a:t>
+              <a:t>1/22/18</a:t>
             </a:fld>
             <a:endParaRPr lang="es-ES"/>
           </a:p>
@@ -2697,7 +2697,7 @@
           <p:cNvPr id="6" name="Marcador de pie de página 5">
             <a:extLst>
               <a:ext uri="{FF2B5EF4-FFF2-40B4-BE49-F238E27FC236}">
-                <a16:creationId xmlns:a16="http://schemas.microsoft.com/office/drawing/2014/main" xmlns="" id="{4CB6508B-84F0-4619-94B6-B93164E6CFD7}"/>
+                <a16:creationId xmlns="" xmlns:a16="http://schemas.microsoft.com/office/drawing/2014/main" id="{4CB6508B-84F0-4619-94B6-B93164E6CFD7}"/>
               </a:ext>
             </a:extLst>
           </p:cNvPr>
@@ -2722,7 +2722,7 @@
           <p:cNvPr id="7" name="Marcador de número de diapositiva 6">
             <a:extLst>
               <a:ext uri="{FF2B5EF4-FFF2-40B4-BE49-F238E27FC236}">
-                <a16:creationId xmlns:a16="http://schemas.microsoft.com/office/drawing/2014/main" xmlns="" id="{3DDBA345-556C-4464-9470-A1CFAA89A493}"/>
+                <a16:creationId xmlns="" xmlns:a16="http://schemas.microsoft.com/office/drawing/2014/main" id="{3DDBA345-556C-4464-9470-A1CFAA89A493}"/>
               </a:ext>
             </a:extLst>
           </p:cNvPr>
@@ -2786,7 +2786,7 @@
           <p:cNvPr id="2" name="Marcador de título 1">
             <a:extLst>
               <a:ext uri="{FF2B5EF4-FFF2-40B4-BE49-F238E27FC236}">
-                <a16:creationId xmlns:a16="http://schemas.microsoft.com/office/drawing/2014/main" xmlns="" id="{D29B908E-8A06-45FA-AE86-7FDA66C5B787}"/>
+                <a16:creationId xmlns="" xmlns:a16="http://schemas.microsoft.com/office/drawing/2014/main" id="{D29B908E-8A06-45FA-AE86-7FDA66C5B787}"/>
               </a:ext>
             </a:extLst>
           </p:cNvPr>
@@ -2824,7 +2824,7 @@
           <p:cNvPr id="3" name="Marcador de texto 2">
             <a:extLst>
               <a:ext uri="{FF2B5EF4-FFF2-40B4-BE49-F238E27FC236}">
-                <a16:creationId xmlns:a16="http://schemas.microsoft.com/office/drawing/2014/main" xmlns="" id="{81464BEA-6AD8-4254-9900-6BD6F54BA918}"/>
+                <a16:creationId xmlns="" xmlns:a16="http://schemas.microsoft.com/office/drawing/2014/main" id="{81464BEA-6AD8-4254-9900-6BD6F54BA918}"/>
               </a:ext>
             </a:extLst>
           </p:cNvPr>
@@ -2891,7 +2891,7 @@
           <p:cNvPr id="4" name="Marcador de fecha 3">
             <a:extLst>
               <a:ext uri="{FF2B5EF4-FFF2-40B4-BE49-F238E27FC236}">
-                <a16:creationId xmlns:a16="http://schemas.microsoft.com/office/drawing/2014/main" xmlns="" id="{D1A555E3-3805-4082-B6F8-E2411E389B48}"/>
+                <a16:creationId xmlns="" xmlns:a16="http://schemas.microsoft.com/office/drawing/2014/main" id="{D1A555E3-3805-4082-B6F8-E2411E389B48}"/>
               </a:ext>
             </a:extLst>
           </p:cNvPr>
@@ -2927,7 +2927,7 @@
           <a:p>
             <a:fld id="{CF65B41C-DF71-4E4D-8C49-7775C482FF76}" type="datetimeFigureOut">
               <a:rPr lang="es-ES" smtClean="0"/>
-              <a:t>1/19/18</a:t>
+              <a:t>1/22/18</a:t>
             </a:fld>
             <a:endParaRPr lang="es-ES"/>
           </a:p>
@@ -2938,7 +2938,7 @@
           <p:cNvPr id="5" name="Marcador de pie de página 4">
             <a:extLst>
               <a:ext uri="{FF2B5EF4-FFF2-40B4-BE49-F238E27FC236}">
-                <a16:creationId xmlns:a16="http://schemas.microsoft.com/office/drawing/2014/main" xmlns="" id="{1AA02B6C-CAA2-404B-B01B-792435274CB8}"/>
+                <a16:creationId xmlns="" xmlns:a16="http://schemas.microsoft.com/office/drawing/2014/main" id="{1AA02B6C-CAA2-404B-B01B-792435274CB8}"/>
               </a:ext>
             </a:extLst>
           </p:cNvPr>
@@ -2981,7 +2981,7 @@
           <p:cNvPr id="6" name="Marcador de número de diapositiva 5">
             <a:extLst>
               <a:ext uri="{FF2B5EF4-FFF2-40B4-BE49-F238E27FC236}">
-                <a16:creationId xmlns:a16="http://schemas.microsoft.com/office/drawing/2014/main" xmlns="" id="{845B2F4B-643F-463B-8D9E-72C748977F23}"/>
+                <a16:creationId xmlns="" xmlns:a16="http://schemas.microsoft.com/office/drawing/2014/main" id="{845B2F4B-643F-463B-8D9E-72C748977F23}"/>
               </a:ext>
             </a:extLst>
           </p:cNvPr>
@@ -3349,7 +3349,7 @@
           <p:cNvPr id="2" name="Título 1">
             <a:extLst>
               <a:ext uri="{FF2B5EF4-FFF2-40B4-BE49-F238E27FC236}">
-                <a16:creationId xmlns:a16="http://schemas.microsoft.com/office/drawing/2014/main" xmlns="" id="{357D16BA-3D2C-4CCD-9EE3-5D656C374152}"/>
+                <a16:creationId xmlns="" xmlns:a16="http://schemas.microsoft.com/office/drawing/2014/main" id="{357D16BA-3D2C-4CCD-9EE3-5D656C374152}"/>
               </a:ext>
             </a:extLst>
           </p:cNvPr>
@@ -4107,11 +4107,7 @@
             </a:r>
             <a:r>
               <a:rPr lang="en-US" dirty="0" smtClean="0"/>
-              <a:t>sed to initialize and download the required provider</a:t>
-            </a:r>
-            <a:r>
-              <a:rPr lang="en-US" dirty="0" smtClean="0"/>
-              <a:t>.</a:t>
+              <a:t>sed to initialize and download the required provider.</a:t>
             </a:r>
           </a:p>
           <a:p>
@@ -4151,7 +4147,6 @@
               <a:rPr lang="en-US" dirty="0" smtClean="0"/>
               <a:t>get the required modules on the configuration files.</a:t>
             </a:r>
-            <a:endParaRPr lang="en-US" dirty="0" smtClean="0"/>
           </a:p>
           <a:p>
             <a:r>
@@ -4638,7 +4633,6 @@
               <a:rPr lang="en-US" dirty="0"/>
               <a:t>.</a:t>
             </a:r>
-            <a:endParaRPr lang="en-US" dirty="0"/>
           </a:p>
         </p:txBody>
       </p:sp>
@@ -4677,7 +4671,7 @@
           <p:cNvPr id="2" name="Título 1">
             <a:extLst>
               <a:ext uri="{FF2B5EF4-FFF2-40B4-BE49-F238E27FC236}">
-                <a16:creationId xmlns:a16="http://schemas.microsoft.com/office/drawing/2014/main" xmlns="" id="{926C6547-DFDE-4A36-B51C-6A25578F73EE}"/>
+                <a16:creationId xmlns="" xmlns:a16="http://schemas.microsoft.com/office/drawing/2014/main" id="{926C6547-DFDE-4A36-B51C-6A25578F73EE}"/>
               </a:ext>
             </a:extLst>
           </p:cNvPr>
@@ -4750,7 +4744,7 @@
           <p:cNvPr id="3" name="Marcador de contenido 2">
             <a:extLst>
               <a:ext uri="{FF2B5EF4-FFF2-40B4-BE49-F238E27FC236}">
-                <a16:creationId xmlns:a16="http://schemas.microsoft.com/office/drawing/2014/main" xmlns="" id="{AF4478E6-8220-44D5-ACCE-D55AB1734B9B}"/>
+                <a16:creationId xmlns="" xmlns:a16="http://schemas.microsoft.com/office/drawing/2014/main" id="{AF4478E6-8220-44D5-ACCE-D55AB1734B9B}"/>
               </a:ext>
             </a:extLst>
           </p:cNvPr>
@@ -5065,7 +5059,7 @@
           <p:cNvPr id="4" name="Marcador de contenido 2">
             <a:extLst>
               <a:ext uri="{FF2B5EF4-FFF2-40B4-BE49-F238E27FC236}">
-                <a16:creationId xmlns:a16="http://schemas.microsoft.com/office/drawing/2014/main" xmlns="" id="{AF4478E6-8220-44D5-ACCE-D55AB1734B9B}"/>
+                <a16:creationId xmlns="" xmlns:a16="http://schemas.microsoft.com/office/drawing/2014/main" id="{AF4478E6-8220-44D5-ACCE-D55AB1734B9B}"/>
               </a:ext>
             </a:extLst>
           </p:cNvPr>
@@ -5452,11 +5446,7 @@
             </a:pPr>
             <a:r>
               <a:rPr lang="en-US" sz="2200" dirty="0" smtClean="0"/>
-              <a:t>And to deploy it, you just </a:t>
-            </a:r>
-            <a:r>
-              <a:rPr lang="en-US" sz="2200" dirty="0" smtClean="0"/>
-              <a:t>a couple of commands: </a:t>
+              <a:t>And to deploy it, you just a couple of commands: </a:t>
             </a:r>
             <a:r>
               <a:rPr lang="en-US" sz="2200" dirty="0" err="1" smtClean="0">
@@ -5689,7 +5679,7 @@
           <p:cNvPr id="2" name="Título 1">
             <a:extLst>
               <a:ext uri="{FF2B5EF4-FFF2-40B4-BE49-F238E27FC236}">
-                <a16:creationId xmlns:a16="http://schemas.microsoft.com/office/drawing/2014/main" xmlns="" id="{48DE6431-4A76-4510-84C1-152592D5AB8A}"/>
+                <a16:creationId xmlns="" xmlns:a16="http://schemas.microsoft.com/office/drawing/2014/main" id="{48DE6431-4A76-4510-84C1-152592D5AB8A}"/>
               </a:ext>
             </a:extLst>
           </p:cNvPr>
@@ -5714,7 +5704,7 @@
           <p:cNvPr id="3" name="Marcador de contenido 2">
             <a:extLst>
               <a:ext uri="{FF2B5EF4-FFF2-40B4-BE49-F238E27FC236}">
-                <a16:creationId xmlns:a16="http://schemas.microsoft.com/office/drawing/2014/main" xmlns="" id="{09EE5894-6056-4BFE-9E08-7E4223060D61}"/>
+                <a16:creationId xmlns="" xmlns:a16="http://schemas.microsoft.com/office/drawing/2014/main" id="{09EE5894-6056-4BFE-9E08-7E4223060D61}"/>
               </a:ext>
             </a:extLst>
           </p:cNvPr>
@@ -5837,7 +5827,7 @@
           <p:cNvPr id="7" name="Conector recto de flecha 6">
             <a:extLst>
               <a:ext uri="{FF2B5EF4-FFF2-40B4-BE49-F238E27FC236}">
-                <a16:creationId xmlns:a16="http://schemas.microsoft.com/office/drawing/2014/main" xmlns="" id="{8FA4A82B-82D0-4D9E-AD3E-5E985FFD80B9}"/>
+                <a16:creationId xmlns="" xmlns:a16="http://schemas.microsoft.com/office/drawing/2014/main" id="{8FA4A82B-82D0-4D9E-AD3E-5E985FFD80B9}"/>
               </a:ext>
             </a:extLst>
           </p:cNvPr>
@@ -5878,7 +5868,7 @@
           <p:cNvPr id="9" name="Conector recto de flecha 8">
             <a:extLst>
               <a:ext uri="{FF2B5EF4-FFF2-40B4-BE49-F238E27FC236}">
-                <a16:creationId xmlns:a16="http://schemas.microsoft.com/office/drawing/2014/main" xmlns="" id="{61AC95CF-2B36-42AD-8BEF-1198809EC464}"/>
+                <a16:creationId xmlns="" xmlns:a16="http://schemas.microsoft.com/office/drawing/2014/main" id="{61AC95CF-2B36-42AD-8BEF-1198809EC464}"/>
               </a:ext>
             </a:extLst>
           </p:cNvPr>
@@ -5949,7 +5939,7 @@
           <p:cNvPr id="2" name="Título 1">
             <a:extLst>
               <a:ext uri="{FF2B5EF4-FFF2-40B4-BE49-F238E27FC236}">
-                <a16:creationId xmlns:a16="http://schemas.microsoft.com/office/drawing/2014/main" xmlns="" id="{0616DFA2-7EBD-43D9-B377-3EAC46AE60A6}"/>
+                <a16:creationId xmlns="" xmlns:a16="http://schemas.microsoft.com/office/drawing/2014/main" id="{0616DFA2-7EBD-43D9-B377-3EAC46AE60A6}"/>
               </a:ext>
             </a:extLst>
           </p:cNvPr>
@@ -5974,7 +5964,7 @@
           <p:cNvPr id="3" name="Marcador de contenido 2">
             <a:extLst>
               <a:ext uri="{FF2B5EF4-FFF2-40B4-BE49-F238E27FC236}">
-                <a16:creationId xmlns:a16="http://schemas.microsoft.com/office/drawing/2014/main" xmlns="" id="{F7C49A22-A1CA-4782-AE49-8D3E933BDE75}"/>
+                <a16:creationId xmlns="" xmlns:a16="http://schemas.microsoft.com/office/drawing/2014/main" id="{F7C49A22-A1CA-4782-AE49-8D3E933BDE75}"/>
               </a:ext>
             </a:extLst>
           </p:cNvPr>
@@ -6642,7 +6632,6 @@
               <a:rPr lang="en-US" dirty="0"/>
               <a:t>in Chapter 6, Scaling and Updating Infrastructure.</a:t>
             </a:r>
-            <a:endParaRPr lang="en-US" dirty="0"/>
           </a:p>
         </p:txBody>
       </p:sp>
@@ -6789,7 +6778,6 @@
               <a:rPr lang="en-US" dirty="0"/>
               <a:t>One problem with count is that it cannot be used with modules.</a:t>
             </a:r>
-            <a:endParaRPr lang="en-US" dirty="0"/>
           </a:p>
         </p:txBody>
       </p:sp>
@@ -6969,7 +6957,6 @@
               <a:rPr lang="en-US" dirty="0"/>
               <a:t>).</a:t>
             </a:r>
-            <a:endParaRPr lang="en-US" dirty="0"/>
           </a:p>
         </p:txBody>
       </p:sp>
@@ -7008,7 +6995,7 @@
           <p:cNvPr id="2" name="Título 1">
             <a:extLst>
               <a:ext uri="{FF2B5EF4-FFF2-40B4-BE49-F238E27FC236}">
-                <a16:creationId xmlns:a16="http://schemas.microsoft.com/office/drawing/2014/main" xmlns="" id="{276CD787-635C-416C-9031-34259FA9C3E0}"/>
+                <a16:creationId xmlns="" xmlns:a16="http://schemas.microsoft.com/office/drawing/2014/main" id="{276CD787-635C-416C-9031-34259FA9C3E0}"/>
               </a:ext>
             </a:extLst>
           </p:cNvPr>
@@ -7058,7 +7045,7 @@
           <p:cNvPr id="3" name="Marcador de contenido 2">
             <a:extLst>
               <a:ext uri="{FF2B5EF4-FFF2-40B4-BE49-F238E27FC236}">
-                <a16:creationId xmlns:a16="http://schemas.microsoft.com/office/drawing/2014/main" xmlns="" id="{FA6906F1-B795-40B4-AC4B-FED1F991AEF8}"/>
+                <a16:creationId xmlns="" xmlns:a16="http://schemas.microsoft.com/office/drawing/2014/main" id="{FA6906F1-B795-40B4-AC4B-FED1F991AEF8}"/>
               </a:ext>
             </a:extLst>
           </p:cNvPr>
@@ -7129,7 +7116,7 @@
           <p:cNvPr id="2" name="Título 1">
             <a:extLst>
               <a:ext uri="{FF2B5EF4-FFF2-40B4-BE49-F238E27FC236}">
-                <a16:creationId xmlns:a16="http://schemas.microsoft.com/office/drawing/2014/main" xmlns="" id="{D5C095A9-C7A2-4465-BA8B-D5FC528C4514}"/>
+                <a16:creationId xmlns="" xmlns:a16="http://schemas.microsoft.com/office/drawing/2014/main" id="{D5C095A9-C7A2-4465-BA8B-D5FC528C4514}"/>
               </a:ext>
             </a:extLst>
           </p:cNvPr>
@@ -7178,7 +7165,7 @@
           <p:cNvPr id="3" name="Marcador de contenido 2">
             <a:extLst>
               <a:ext uri="{FF2B5EF4-FFF2-40B4-BE49-F238E27FC236}">
-                <a16:creationId xmlns:a16="http://schemas.microsoft.com/office/drawing/2014/main" xmlns="" id="{040D3805-CDF2-4B71-993C-DF9CA2221FAD}"/>
+                <a16:creationId xmlns="" xmlns:a16="http://schemas.microsoft.com/office/drawing/2014/main" id="{040D3805-CDF2-4B71-993C-DF9CA2221FAD}"/>
               </a:ext>
             </a:extLst>
           </p:cNvPr>
@@ -8112,11 +8099,6 @@
               </a:rPr>
               <a:t>which solves some of the problems that open source version doesn't handle well</a:t>
             </a:r>
-            <a:endParaRPr lang="en-US" sz="1600" dirty="0">
-              <a:solidFill>
-                <a:srgbClr val="008000"/>
-              </a:solidFill>
-            </a:endParaRPr>
           </a:p>
         </p:txBody>
       </p:sp>
@@ -9826,7 +9808,6 @@
               <a:rPr lang="en-US" dirty="0"/>
               <a:t>one and is available as part of Free Tier offering.</a:t>
             </a:r>
-            <a:endParaRPr lang="en-US" dirty="0"/>
           </a:p>
         </p:txBody>
       </p:sp>
@@ -9865,7 +9846,7 @@
           <p:cNvPr id="2" name="Título 1">
             <a:extLst>
               <a:ext uri="{FF2B5EF4-FFF2-40B4-BE49-F238E27FC236}">
-                <a16:creationId xmlns:a16="http://schemas.microsoft.com/office/drawing/2014/main" xmlns="" id="{D2E05DA4-F097-4731-B097-9A8D92491C6A}"/>
+                <a16:creationId xmlns="" xmlns:a16="http://schemas.microsoft.com/office/drawing/2014/main" id="{D2E05DA4-F097-4731-B097-9A8D92491C6A}"/>
               </a:ext>
             </a:extLst>
           </p:cNvPr>
@@ -9922,7 +9903,7 @@
           <p:cNvPr id="3" name="Marcador de contenido 2">
             <a:extLst>
               <a:ext uri="{FF2B5EF4-FFF2-40B4-BE49-F238E27FC236}">
-                <a16:creationId xmlns:a16="http://schemas.microsoft.com/office/drawing/2014/main" xmlns="" id="{72058AC2-F6B1-4366-BEE1-37D5B127EA0F}"/>
+                <a16:creationId xmlns="" xmlns:a16="http://schemas.microsoft.com/office/drawing/2014/main" id="{72058AC2-F6B1-4366-BEE1-37D5B127EA0F}"/>
               </a:ext>
             </a:extLst>
           </p:cNvPr>
@@ -10470,7 +10451,7 @@
   <a:extraClrSchemeLst/>
   <a:extLst>
     <a:ext uri="{05A4C25C-085E-4340-85A3-A5531E510DB2}">
-      <thm15:themeFamily xmlns:thm15="http://schemas.microsoft.com/office/thememl/2012/main" xmlns="" name="Office Theme" id="{62F939B6-93AF-4DB8-9C6B-D6C7DFDC589F}" vid="{4A3C46E8-61CC-4603-A589-7422A47A8E4A}"/>
+      <thm15:themeFamily xmlns="" xmlns:thm15="http://schemas.microsoft.com/office/thememl/2012/main" name="Office Theme" id="{62F939B6-93AF-4DB8-9C6B-D6C7DFDC589F}" vid="{4A3C46E8-61CC-4603-A589-7422A47A8E4A}"/>
     </a:ext>
   </a:extLst>
 </a:theme>

</xml_diff>